<commit_message>
made all the changes except objective section
</commit_message>
<xml_diff>
--- a/FinalProject/CA_presentation.pptx
+++ b/FinalProject/CA_presentation.pptx
@@ -139,7 +139,7 @@
   </p:defaultTextStyle>
   <p:extLst>
     <p:ext uri="{EFAFB233-063F-42B5-8137-9DF3F51BA10A}">
-      <p15:sldGuideLst xmlns:p15="http://schemas.microsoft.com/office/powerpoint/2012/main" xmlns="">
+      <p15:sldGuideLst xmlns="" xmlns:p15="http://schemas.microsoft.com/office/powerpoint/2012/main">
         <p15:guide id="1" orient="horz" pos="3224">
           <p15:clr>
             <a:srgbClr val="A4A3A4"/>
@@ -2614,7 +2614,7 @@
           <a:graphicData uri="http://schemas.openxmlformats.org/presentationml/2006/ole">
             <mc:AlternateContent xmlns:mc="http://schemas.openxmlformats.org/markup-compatibility/2006">
               <mc:Choice xmlns:v="urn:schemas-microsoft-com:vml" Requires="v">
-                <p:oleObj spid="_x0000_s1066" name="CorelDRAW" r:id="rId14" imgW="8828280" imgH="313200" progId="CorelDRAW.Graphic.13">
+                <p:oleObj spid="_x0000_s1072" name="CorelDRAW" r:id="rId14" imgW="8828280" imgH="313200" progId="CorelDRAW.Graphic.13">
                   <p:embed/>
                 </p:oleObj>
               </mc:Choice>
@@ -3478,7 +3478,13 @@
               <a:rPr lang="en-US" altLang="en-US" sz="3600" b="1" dirty="0" smtClean="0">
                 <a:latin typeface="+mj-lt"/>
               </a:rPr>
-              <a:t>California State Legislature</a:t>
+              <a:t>California </a:t>
+            </a:r>
+            <a:r>
+              <a:rPr lang="en-US" altLang="en-US" sz="3600" b="1" dirty="0" smtClean="0">
+                <a:latin typeface="+mj-lt"/>
+              </a:rPr>
+              <a:t>State Legislature</a:t>
             </a:r>
           </a:p>
           <a:p>
@@ -3568,7 +3574,7 @@
         </p:nvSpPr>
         <p:spPr bwMode="auto">
           <a:xfrm>
-            <a:off x="514350" y="9209329"/>
+            <a:off x="514350" y="9350435"/>
             <a:ext cx="7372350" cy="1004662"/>
           </a:xfrm>
           <a:prstGeom prst="rect">
@@ -3717,7 +3723,7 @@
               </a:spcBef>
             </a:pPr>
             <a:r>
-              <a:rPr lang="en-US" altLang="en-US" sz="5000" b="1" dirty="0" smtClean="0"/>
+              <a:rPr lang="en-US" altLang="en-US" sz="4400" b="1" dirty="0" smtClean="0"/>
               <a:t>Data</a:t>
             </a:r>
             <a:r>
@@ -3726,11 +3732,7 @@
             </a:r>
             <a:r>
               <a:rPr lang="en-US" altLang="en-US" sz="3000" b="1" dirty="0" smtClean="0"/>
-              <a:t>(1974 </a:t>
-            </a:r>
-            <a:r>
-              <a:rPr lang="en-US" altLang="en-US" sz="3000" b="1" dirty="0" smtClean="0"/>
-              <a:t>to present)</a:t>
+              <a:t>(1974 to present)</a:t>
             </a:r>
             <a:endParaRPr lang="en-US" altLang="en-US" sz="3000" b="1" dirty="0"/>
           </a:p>
@@ -4429,7 +4431,7 @@
         <p:spPr bwMode="auto">
           <a:xfrm>
             <a:off x="25122578" y="16800697"/>
-            <a:ext cx="6229350" cy="773830"/>
+            <a:ext cx="6229350" cy="743052"/>
           </a:xfrm>
           <a:prstGeom prst="rect">
             <a:avLst/>
@@ -4577,7 +4579,7 @@
               </a:spcBef>
             </a:pPr>
             <a:r>
-              <a:rPr lang="en-US" altLang="en-US" sz="4600" dirty="0" smtClean="0"/>
+              <a:rPr lang="en-US" altLang="en-US" sz="4400" dirty="0" smtClean="0"/>
               <a:t>References</a:t>
             </a:r>
           </a:p>
@@ -5015,21 +5017,7 @@
                 <a:latin typeface="Arial"/>
                 <a:cs typeface="Arial"/>
               </a:rPr>
-              <a:t>, Carl. </a:t>
-            </a:r>
-            <a:r>
-              <a:rPr lang="en-US" altLang="en-US" sz="2000" b="1" dirty="0" smtClean="0">
-                <a:latin typeface="Arial"/>
-                <a:cs typeface="Arial"/>
-              </a:rPr>
-              <a:t>California</a:t>
-            </a:r>
-            <a:r>
-              <a:rPr lang="en-US" altLang="en-US" sz="2000" b="1" dirty="0" smtClean="0">
-                <a:latin typeface="Arial"/>
-                <a:cs typeface="Arial"/>
-              </a:rPr>
-              <a:t> State Legislative Forecast Data.</a:t>
+              <a:t>, Carl. California State Legislative Forecast Data.</a:t>
             </a:r>
             <a:endParaRPr lang="en-US" altLang="en-US" sz="2000" b="1" dirty="0">
               <a:latin typeface="Arial"/>
@@ -5150,28 +5138,7 @@
                 <a:latin typeface="Arial"/>
                 <a:cs typeface="Arial"/>
               </a:rPr>
-              <a:t>Table 2.1. P</a:t>
-            </a:r>
-            <a:r>
-              <a:rPr lang="en-US" altLang="en-US" sz="2000" b="1" dirty="0" smtClean="0">
-                <a:latin typeface="Arial"/>
-                <a:cs typeface="Arial"/>
-              </a:rPr>
-              <a:t>ersonal Income and </a:t>
-            </a:r>
-            <a:r>
-              <a:rPr lang="en-US" altLang="en-US" sz="2000" b="1" dirty="0" smtClean="0">
-                <a:latin typeface="Arial"/>
-                <a:cs typeface="Arial"/>
-              </a:rPr>
-              <a:t>Its Disposition. </a:t>
-            </a:r>
-            <a:r>
-              <a:rPr lang="en-US" altLang="en-US" sz="2000" b="1" dirty="0" smtClean="0">
-                <a:latin typeface="Arial"/>
-                <a:cs typeface="Arial"/>
-              </a:rPr>
-              <a:t>US Bureau of </a:t>
+              <a:t>Table 2.1. Personal Income and Its Disposition. US Bureau of </a:t>
             </a:r>
             <a:r>
               <a:rPr lang="en-US" altLang="en-US" sz="2000" b="1" dirty="0">
@@ -5187,10 +5154,6 @@
               </a:rPr>
               <a:t>.</a:t>
             </a:r>
-            <a:endParaRPr lang="en-US" altLang="en-US" sz="2000" b="1" dirty="0" smtClean="0">
-              <a:latin typeface="Arial"/>
-              <a:cs typeface="Arial"/>
-            </a:endParaRPr>
           </a:p>
           <a:p>
             <a:pPr marL="0" indent="0" eaLnBrk="0" hangingPunct="0">
@@ -5237,8 +5200,8 @@
         </p:nvSpPr>
         <p:spPr bwMode="auto">
           <a:xfrm>
-            <a:off x="24637586" y="6571768"/>
-            <a:ext cx="7309264" cy="10967233"/>
+            <a:off x="24637586" y="6092005"/>
+            <a:ext cx="7309264" cy="11435053"/>
           </a:xfrm>
           <a:prstGeom prst="rect">
             <a:avLst/>
@@ -5509,12 +5472,30 @@
                 <a:spcPct val="95000"/>
               </a:lnSpc>
             </a:pPr>
+            <a:endParaRPr lang="en-US" altLang="en-US" sz="3200" b="1" dirty="0" smtClean="0">
+              <a:latin typeface="Arial"/>
+              <a:cs typeface="Arial"/>
+            </a:endParaRPr>
+          </a:p>
+          <a:p>
+            <a:pPr marL="652463" lvl="2" eaLnBrk="0" hangingPunct="0">
+              <a:lnSpc>
+                <a:spcPct val="95000"/>
+              </a:lnSpc>
+            </a:pPr>
             <a:r>
               <a:rPr lang="en-US" altLang="en-US" sz="3200" b="1" dirty="0" smtClean="0">
                 <a:latin typeface="Arial"/>
                 <a:cs typeface="Arial"/>
               </a:rPr>
-              <a:t>Why?</a:t>
+              <a:t>Why</a:t>
+            </a:r>
+            <a:r>
+              <a:rPr lang="en-US" altLang="en-US" sz="3200" b="1" dirty="0" smtClean="0">
+                <a:latin typeface="Arial"/>
+                <a:cs typeface="Arial"/>
+              </a:rPr>
+              <a:t>?</a:t>
             </a:r>
           </a:p>
           <a:p>
@@ -5603,7 +5584,7 @@
         <p:spPr bwMode="auto">
           <a:xfrm>
             <a:off x="585304" y="3415483"/>
-            <a:ext cx="7372350" cy="835385"/>
+            <a:ext cx="7372350" cy="743052"/>
           </a:xfrm>
           <a:prstGeom prst="rect">
             <a:avLst/>
@@ -5751,7 +5732,7 @@
               </a:spcBef>
             </a:pPr>
             <a:r>
-              <a:rPr lang="en-US" altLang="en-US" sz="5000" b="1" dirty="0"/>
+              <a:rPr lang="en-US" altLang="en-US" sz="4400" b="1" dirty="0"/>
               <a:t>Introduction</a:t>
             </a:r>
           </a:p>
@@ -5768,7 +5749,7 @@
         <p:spPr bwMode="auto">
           <a:xfrm>
             <a:off x="24606043" y="4368800"/>
-            <a:ext cx="7372350" cy="1943381"/>
+            <a:ext cx="7372350" cy="1420161"/>
           </a:xfrm>
           <a:prstGeom prst="rect">
             <a:avLst/>
@@ -5916,10 +5897,10 @@
               </a:spcBef>
             </a:pPr>
             <a:r>
-              <a:rPr lang="en-US" altLang="en-US" b="1" dirty="0" smtClean="0"/>
+              <a:rPr lang="en-US" altLang="en-US" sz="4400" b="1" dirty="0" smtClean="0"/>
               <a:t>How to model for state elections</a:t>
             </a:r>
-            <a:endParaRPr lang="en-US" altLang="en-US" b="1" dirty="0"/>
+            <a:endParaRPr lang="en-US" altLang="en-US" sz="4400" b="1" dirty="0"/>
           </a:p>
         </p:txBody>
       </p:sp>
@@ -6166,7 +6147,7 @@
         <p:spPr>
           <a:xfrm>
             <a:off x="10184405" y="14852424"/>
-            <a:ext cx="12358606" cy="1031051"/>
+            <a:ext cx="12358606" cy="769441"/>
           </a:xfrm>
           <a:prstGeom prst="rect">
             <a:avLst/>
@@ -6180,18 +6161,18 @@
           <a:lstStyle/>
           <a:p>
             <a:r>
-              <a:rPr lang="en-US" b="1" dirty="0" smtClean="0"/>
+              <a:rPr lang="en-US" sz="4400" b="1" dirty="0" smtClean="0"/>
               <a:t>2018 Election Results </a:t>
             </a:r>
             <a:r>
-              <a:rPr lang="en-US" b="1" dirty="0"/>
+              <a:rPr lang="en-US" sz="4400" b="1" dirty="0"/>
               <a:t>F</a:t>
             </a:r>
             <a:r>
-              <a:rPr lang="en-US" b="1" dirty="0" smtClean="0"/>
+              <a:rPr lang="en-US" sz="4400" b="1" dirty="0" smtClean="0"/>
               <a:t>orecast</a:t>
             </a:r>
-            <a:endParaRPr lang="en-US" dirty="0"/>
+            <a:endParaRPr lang="en-US" sz="4400" dirty="0"/>
           </a:p>
         </p:txBody>
       </p:sp>
@@ -6602,7 +6583,7 @@
       </p:pic>
       <p:pic>
         <p:nvPicPr>
-          <p:cNvPr id="17" name="Picture 16" descr="Screen Shot 2017-05-10 at 1.38.29 AM.png"/>
+          <p:cNvPr id="18" name="Picture 17" descr="Screen Shot 2017-05-16 at 8.44.03 PM.png"/>
           <p:cNvPicPr>
             <a:picLocks noChangeAspect="1"/>
           </p:cNvPicPr>
@@ -6622,8 +6603,8 @@
         </p:blipFill>
         <p:spPr>
           <a:xfrm>
-            <a:off x="26561685" y="11098064"/>
-            <a:ext cx="3467100" cy="1384300"/>
+            <a:off x="26771769" y="10720955"/>
+            <a:ext cx="3073400" cy="1663700"/>
           </a:xfrm>
           <a:prstGeom prst="rect">
             <a:avLst/>

</xml_diff>

<commit_message>
made all the changes except the objective section
</commit_message>
<xml_diff>
--- a/FinalProject/CA_presentation.pptx
+++ b/FinalProject/CA_presentation.pptx
@@ -2614,7 +2614,7 @@
           <a:graphicData uri="http://schemas.openxmlformats.org/presentationml/2006/ole">
             <mc:AlternateContent xmlns:mc="http://schemas.openxmlformats.org/markup-compatibility/2006">
               <mc:Choice xmlns:v="urn:schemas-microsoft-com:vml" Requires="v">
-                <p:oleObj spid="_x0000_s1072" name="CorelDRAW" r:id="rId14" imgW="8828280" imgH="313200" progId="CorelDRAW.Graphic.13">
+                <p:oleObj spid="_x0000_s1077" name="CorelDRAW" r:id="rId14" imgW="8828280" imgH="313200" progId="CorelDRAW.Graphic.13">
                   <p:embed/>
                 </p:oleObj>
               </mc:Choice>
@@ -3310,7 +3310,7 @@
           <a:bodyPr wrap="none" anchor="ctr"/>
           <a:lstStyle/>
           <a:p>
-            <a:endParaRPr lang="en-US"/>
+            <a:endParaRPr lang="en-US" dirty="0"/>
           </a:p>
         </p:txBody>
       </p:sp>
@@ -3324,7 +3324,7 @@
         </p:nvSpPr>
         <p:spPr bwMode="auto">
           <a:xfrm>
-            <a:off x="615800" y="4365090"/>
+            <a:off x="615800" y="5381058"/>
             <a:ext cx="7334250" cy="4747225"/>
           </a:xfrm>
           <a:prstGeom prst="rect">
@@ -3574,7 +3574,7 @@
         </p:nvSpPr>
         <p:spPr bwMode="auto">
           <a:xfrm>
-            <a:off x="514350" y="9350435"/>
+            <a:off x="514350" y="9547984"/>
             <a:ext cx="7372350" cy="1004662"/>
           </a:xfrm>
           <a:prstGeom prst="rect">
@@ -5732,9 +5732,10 @@
               </a:spcBef>
             </a:pPr>
             <a:r>
-              <a:rPr lang="en-US" altLang="en-US" sz="4400" b="1" dirty="0"/>
-              <a:t>Introduction</a:t>
-            </a:r>
+              <a:rPr lang="en-US" altLang="en-US" sz="4400" b="1" dirty="0" smtClean="0"/>
+              <a:t>Objective</a:t>
+            </a:r>
+            <a:endParaRPr lang="en-US" altLang="en-US" sz="4400" b="1" dirty="0"/>
           </a:p>
         </p:txBody>
       </p:sp>
@@ -6573,8 +6574,8 @@
         </p:blipFill>
         <p:spPr>
           <a:xfrm>
-            <a:off x="1493569" y="18122818"/>
-            <a:ext cx="5395598" cy="3105257"/>
+            <a:off x="1439363" y="18205321"/>
+            <a:ext cx="5252243" cy="3022754"/>
           </a:xfrm>
           <a:prstGeom prst="rect">
             <a:avLst/>
@@ -6611,6 +6612,171 @@
           </a:prstGeom>
         </p:spPr>
       </p:pic>
+      <p:sp>
+        <p:nvSpPr>
+          <p:cNvPr id="36" name="Text Box 42"/>
+          <p:cNvSpPr txBox="1">
+            <a:spLocks noChangeArrowheads="1"/>
+          </p:cNvSpPr>
+          <p:nvPr/>
+        </p:nvSpPr>
+        <p:spPr bwMode="auto">
+          <a:xfrm>
+            <a:off x="596590" y="4527409"/>
+            <a:ext cx="7372350" cy="743052"/>
+          </a:xfrm>
+          <a:prstGeom prst="rect">
+            <a:avLst/>
+          </a:prstGeom>
+          <a:noFill/>
+          <a:ln>
+            <a:noFill/>
+          </a:ln>
+          <a:effectLst/>
+          <a:extLst>
+            <a:ext uri="{909E8E84-426E-40dd-AFC4-6F175D3DCCD1}">
+              <a14:hiddenFill xmlns:a14="http://schemas.microsoft.com/office/drawing/2010/main">
+                <a:solidFill>
+                  <a:schemeClr val="accent1"/>
+                </a:solidFill>
+              </a14:hiddenFill>
+            </a:ext>
+            <a:ext uri="{91240B29-F687-4f45-9708-019B960494DF}">
+              <a14:hiddenLine xmlns:a14="http://schemas.microsoft.com/office/drawing/2010/main" w="9525">
+                <a:solidFill>
+                  <a:schemeClr val="tx1"/>
+                </a:solidFill>
+                <a:miter lim="800000"/>
+                <a:headEnd/>
+                <a:tailEnd/>
+              </a14:hiddenLine>
+            </a:ext>
+            <a:ext uri="{AF507438-7753-43e0-B8FC-AC1667EBCBE1}">
+              <a14:hiddenEffects xmlns:a14="http://schemas.microsoft.com/office/drawing/2010/main">
+                <a:effectLst>
+                  <a:outerShdw dist="35921" dir="2700000" algn="ctr" rotWithShape="0">
+                    <a:schemeClr val="bg2"/>
+                  </a:outerShdw>
+                </a:effectLst>
+              </a14:hiddenEffects>
+            </a:ext>
+          </a:extLst>
+        </p:spPr>
+        <p:txBody>
+          <a:bodyPr lIns="65306" tIns="32653" rIns="65306" bIns="32653">
+            <a:spAutoFit/>
+          </a:bodyPr>
+          <a:lstStyle>
+            <a:lvl1pPr algn="l" defTabSz="3135313">
+              <a:defRPr>
+                <a:solidFill>
+                  <a:schemeClr val="tx1"/>
+                </a:solidFill>
+                <a:latin typeface="Arial" charset="0"/>
+              </a:defRPr>
+            </a:lvl1pPr>
+            <a:lvl2pPr marL="327025" algn="l" defTabSz="3135313">
+              <a:defRPr>
+                <a:solidFill>
+                  <a:schemeClr val="tx1"/>
+                </a:solidFill>
+                <a:latin typeface="Arial" charset="0"/>
+              </a:defRPr>
+            </a:lvl2pPr>
+            <a:lvl3pPr marL="652463" algn="l" defTabSz="3135313">
+              <a:defRPr>
+                <a:solidFill>
+                  <a:schemeClr val="tx1"/>
+                </a:solidFill>
+                <a:latin typeface="Arial" charset="0"/>
+              </a:defRPr>
+            </a:lvl3pPr>
+            <a:lvl4pPr marL="979488" algn="l" defTabSz="3135313">
+              <a:defRPr>
+                <a:solidFill>
+                  <a:schemeClr val="tx1"/>
+                </a:solidFill>
+                <a:latin typeface="Arial" charset="0"/>
+              </a:defRPr>
+            </a:lvl4pPr>
+            <a:lvl5pPr marL="1306513" algn="l" defTabSz="3135313">
+              <a:defRPr>
+                <a:solidFill>
+                  <a:schemeClr val="tx1"/>
+                </a:solidFill>
+                <a:latin typeface="Arial" charset="0"/>
+              </a:defRPr>
+            </a:lvl5pPr>
+            <a:lvl6pPr marL="1763713" defTabSz="3135313" fontAlgn="base">
+              <a:spcBef>
+                <a:spcPct val="0"/>
+              </a:spcBef>
+              <a:spcAft>
+                <a:spcPct val="0"/>
+              </a:spcAft>
+              <a:defRPr>
+                <a:solidFill>
+                  <a:schemeClr val="tx1"/>
+                </a:solidFill>
+                <a:latin typeface="Arial" charset="0"/>
+              </a:defRPr>
+            </a:lvl6pPr>
+            <a:lvl7pPr marL="2220913" defTabSz="3135313" fontAlgn="base">
+              <a:spcBef>
+                <a:spcPct val="0"/>
+              </a:spcBef>
+              <a:spcAft>
+                <a:spcPct val="0"/>
+              </a:spcAft>
+              <a:defRPr>
+                <a:solidFill>
+                  <a:schemeClr val="tx1"/>
+                </a:solidFill>
+                <a:latin typeface="Arial" charset="0"/>
+              </a:defRPr>
+            </a:lvl7pPr>
+            <a:lvl8pPr marL="2678113" defTabSz="3135313" fontAlgn="base">
+              <a:spcBef>
+                <a:spcPct val="0"/>
+              </a:spcBef>
+              <a:spcAft>
+                <a:spcPct val="0"/>
+              </a:spcAft>
+              <a:defRPr>
+                <a:solidFill>
+                  <a:schemeClr val="tx1"/>
+                </a:solidFill>
+                <a:latin typeface="Arial" charset="0"/>
+              </a:defRPr>
+            </a:lvl8pPr>
+            <a:lvl9pPr marL="3135313" defTabSz="3135313" fontAlgn="base">
+              <a:spcBef>
+                <a:spcPct val="0"/>
+              </a:spcBef>
+              <a:spcAft>
+                <a:spcPct val="0"/>
+              </a:spcAft>
+              <a:defRPr>
+                <a:solidFill>
+                  <a:schemeClr val="tx1"/>
+                </a:solidFill>
+                <a:latin typeface="Arial" charset="0"/>
+              </a:defRPr>
+            </a:lvl9pPr>
+          </a:lstStyle>
+          <a:p>
+            <a:pPr algn="ctr">
+              <a:spcBef>
+                <a:spcPct val="50000"/>
+              </a:spcBef>
+            </a:pPr>
+            <a:r>
+              <a:rPr lang="en-US" altLang="en-US" sz="4400" b="1" dirty="0"/>
+              <a:t>Introduction</a:t>
+            </a:r>
+          </a:p>
+        </p:txBody>
+      </p:sp>
     </p:spTree>
   </p:cSld>
   <p:clrMapOvr>

</xml_diff>